<commit_message>
Added code for Naive Bayse and ROC AUC and SVR
</commit_message>
<xml_diff>
--- a/Machine-Learning/4.5 Decision-Tree/0 decision-trees.pptx
+++ b/Machine-Learning/4.5 Decision-Tree/0 decision-trees.pptx
@@ -294,7 +294,7 @@
           <a:p>
             <a:fld id="{EB313334-EC91-4D3F-87AB-6DA805BE7D8B}" type="datetimeFigureOut">
               <a:rPr lang="nl-NL" smtClean="0"/>
-              <a:t>31-5-2019</a:t>
+              <a:t>1-6-2019</a:t>
             </a:fld>
             <a:endParaRPr lang="nl-NL"/>
           </a:p>
@@ -494,7 +494,7 @@
           <a:p>
             <a:fld id="{EB313334-EC91-4D3F-87AB-6DA805BE7D8B}" type="datetimeFigureOut">
               <a:rPr lang="nl-NL" smtClean="0"/>
-              <a:t>31-5-2019</a:t>
+              <a:t>1-6-2019</a:t>
             </a:fld>
             <a:endParaRPr lang="nl-NL"/>
           </a:p>
@@ -704,7 +704,7 @@
           <a:p>
             <a:fld id="{EB313334-EC91-4D3F-87AB-6DA805BE7D8B}" type="datetimeFigureOut">
               <a:rPr lang="nl-NL" smtClean="0"/>
-              <a:t>31-5-2019</a:t>
+              <a:t>1-6-2019</a:t>
             </a:fld>
             <a:endParaRPr lang="nl-NL"/>
           </a:p>
@@ -904,7 +904,7 @@
           <a:p>
             <a:fld id="{EB313334-EC91-4D3F-87AB-6DA805BE7D8B}" type="datetimeFigureOut">
               <a:rPr lang="nl-NL" smtClean="0"/>
-              <a:t>31-5-2019</a:t>
+              <a:t>1-6-2019</a:t>
             </a:fld>
             <a:endParaRPr lang="nl-NL"/>
           </a:p>
@@ -1180,7 +1180,7 @@
           <a:p>
             <a:fld id="{EB313334-EC91-4D3F-87AB-6DA805BE7D8B}" type="datetimeFigureOut">
               <a:rPr lang="nl-NL" smtClean="0"/>
-              <a:t>31-5-2019</a:t>
+              <a:t>1-6-2019</a:t>
             </a:fld>
             <a:endParaRPr lang="nl-NL"/>
           </a:p>
@@ -1448,7 +1448,7 @@
           <a:p>
             <a:fld id="{EB313334-EC91-4D3F-87AB-6DA805BE7D8B}" type="datetimeFigureOut">
               <a:rPr lang="nl-NL" smtClean="0"/>
-              <a:t>31-5-2019</a:t>
+              <a:t>1-6-2019</a:t>
             </a:fld>
             <a:endParaRPr lang="nl-NL"/>
           </a:p>
@@ -1863,7 +1863,7 @@
           <a:p>
             <a:fld id="{EB313334-EC91-4D3F-87AB-6DA805BE7D8B}" type="datetimeFigureOut">
               <a:rPr lang="nl-NL" smtClean="0"/>
-              <a:t>31-5-2019</a:t>
+              <a:t>1-6-2019</a:t>
             </a:fld>
             <a:endParaRPr lang="nl-NL"/>
           </a:p>
@@ -2005,7 +2005,7 @@
           <a:p>
             <a:fld id="{EB313334-EC91-4D3F-87AB-6DA805BE7D8B}" type="datetimeFigureOut">
               <a:rPr lang="nl-NL" smtClean="0"/>
-              <a:t>31-5-2019</a:t>
+              <a:t>1-6-2019</a:t>
             </a:fld>
             <a:endParaRPr lang="nl-NL"/>
           </a:p>
@@ -2118,7 +2118,7 @@
           <a:p>
             <a:fld id="{EB313334-EC91-4D3F-87AB-6DA805BE7D8B}" type="datetimeFigureOut">
               <a:rPr lang="nl-NL" smtClean="0"/>
-              <a:t>31-5-2019</a:t>
+              <a:t>1-6-2019</a:t>
             </a:fld>
             <a:endParaRPr lang="nl-NL"/>
           </a:p>
@@ -2431,7 +2431,7 @@
           <a:p>
             <a:fld id="{EB313334-EC91-4D3F-87AB-6DA805BE7D8B}" type="datetimeFigureOut">
               <a:rPr lang="nl-NL" smtClean="0"/>
-              <a:t>31-5-2019</a:t>
+              <a:t>1-6-2019</a:t>
             </a:fld>
             <a:endParaRPr lang="nl-NL"/>
           </a:p>
@@ -2720,7 +2720,7 @@
           <a:p>
             <a:fld id="{EB313334-EC91-4D3F-87AB-6DA805BE7D8B}" type="datetimeFigureOut">
               <a:rPr lang="nl-NL" smtClean="0"/>
-              <a:t>31-5-2019</a:t>
+              <a:t>1-6-2019</a:t>
             </a:fld>
             <a:endParaRPr lang="nl-NL"/>
           </a:p>
@@ -2963,7 +2963,7 @@
           <a:p>
             <a:fld id="{EB313334-EC91-4D3F-87AB-6DA805BE7D8B}" type="datetimeFigureOut">
               <a:rPr lang="nl-NL" smtClean="0"/>
-              <a:t>31-5-2019</a:t>
+              <a:t>1-6-2019</a:t>
             </a:fld>
             <a:endParaRPr lang="nl-NL"/>
           </a:p>

</xml_diff>